<commit_message>
updated powerpoint, and added Jades data
</commit_message>
<xml_diff>
--- a/FinalProject/Presentation.pptx
+++ b/FinalProject/Presentation.pptx
@@ -10,7 +10,8 @@
     <p:sldId id="258" r:id="rId4"/>
     <p:sldId id="260" r:id="rId5"/>
     <p:sldId id="259" r:id="rId6"/>
-    <p:sldId id="262" r:id="rId7"/>
+    <p:sldId id="263" r:id="rId7"/>
+    <p:sldId id="262" r:id="rId8"/>
   </p:sldIdLst>
   <p:sldSz cx="12192000" cy="6858000"/>
   <p:notesSz cx="6858000" cy="9144000"/>
@@ -264,7 +265,7 @@
           <a:p>
             <a:fld id="{0DAF61AA-5A98-4049-A93E-477E5505141A}" type="datetimeFigureOut">
               <a:rPr lang="en-US" smtClean="0"/>
-              <a:t>3/27/2023</a:t>
+              <a:t>4/2/23</a:t>
             </a:fld>
             <a:endParaRPr lang="en-US" dirty="0"/>
           </a:p>
@@ -462,7 +463,7 @@
           <a:p>
             <a:fld id="{0DAF61AA-5A98-4049-A93E-477E5505141A}" type="datetimeFigureOut">
               <a:rPr lang="en-US" smtClean="0"/>
-              <a:t>3/27/2023</a:t>
+              <a:t>4/2/23</a:t>
             </a:fld>
             <a:endParaRPr lang="en-US"/>
           </a:p>
@@ -670,7 +671,7 @@
           <a:p>
             <a:fld id="{0DAF61AA-5A98-4049-A93E-477E5505141A}" type="datetimeFigureOut">
               <a:rPr lang="en-US" smtClean="0"/>
-              <a:t>3/27/2023</a:t>
+              <a:t>4/2/23</a:t>
             </a:fld>
             <a:endParaRPr lang="en-US"/>
           </a:p>
@@ -868,7 +869,7 @@
           <a:p>
             <a:fld id="{0DAF61AA-5A98-4049-A93E-477E5505141A}" type="datetimeFigureOut">
               <a:rPr lang="en-US" smtClean="0"/>
-              <a:t>3/27/2023</a:t>
+              <a:t>4/2/23</a:t>
             </a:fld>
             <a:endParaRPr lang="en-US"/>
           </a:p>
@@ -1143,7 +1144,7 @@
           <a:p>
             <a:fld id="{0DAF61AA-5A98-4049-A93E-477E5505141A}" type="datetimeFigureOut">
               <a:rPr lang="en-US" smtClean="0"/>
-              <a:t>3/27/2023</a:t>
+              <a:t>4/2/23</a:t>
             </a:fld>
             <a:endParaRPr lang="en-US"/>
           </a:p>
@@ -1408,7 +1409,7 @@
           <a:p>
             <a:fld id="{0DAF61AA-5A98-4049-A93E-477E5505141A}" type="datetimeFigureOut">
               <a:rPr lang="en-US" smtClean="0"/>
-              <a:t>3/27/2023</a:t>
+              <a:t>4/2/23</a:t>
             </a:fld>
             <a:endParaRPr lang="en-US"/>
           </a:p>
@@ -1820,7 +1821,7 @@
           <a:p>
             <a:fld id="{0DAF61AA-5A98-4049-A93E-477E5505141A}" type="datetimeFigureOut">
               <a:rPr lang="en-US" smtClean="0"/>
-              <a:t>3/27/2023</a:t>
+              <a:t>4/2/23</a:t>
             </a:fld>
             <a:endParaRPr lang="en-US"/>
           </a:p>
@@ -1961,7 +1962,7 @@
           <a:p>
             <a:fld id="{0DAF61AA-5A98-4049-A93E-477E5505141A}" type="datetimeFigureOut">
               <a:rPr lang="en-US" smtClean="0"/>
-              <a:t>3/27/2023</a:t>
+              <a:t>4/2/23</a:t>
             </a:fld>
             <a:endParaRPr lang="en-US"/>
           </a:p>
@@ -2074,7 +2075,7 @@
           <a:p>
             <a:fld id="{0DAF61AA-5A98-4049-A93E-477E5505141A}" type="datetimeFigureOut">
               <a:rPr lang="en-US" smtClean="0"/>
-              <a:t>3/27/2023</a:t>
+              <a:t>4/2/23</a:t>
             </a:fld>
             <a:endParaRPr lang="en-US"/>
           </a:p>
@@ -2385,7 +2386,7 @@
           <a:p>
             <a:fld id="{0DAF61AA-5A98-4049-A93E-477E5505141A}" type="datetimeFigureOut">
               <a:rPr lang="en-US" smtClean="0"/>
-              <a:t>3/27/2023</a:t>
+              <a:t>4/2/23</a:t>
             </a:fld>
             <a:endParaRPr lang="en-US"/>
           </a:p>
@@ -2676,7 +2677,7 @@
           <a:p>
             <a:fld id="{0DAF61AA-5A98-4049-A93E-477E5505141A}" type="datetimeFigureOut">
               <a:rPr lang="en-US" smtClean="0"/>
-              <a:t>3/27/2023</a:t>
+              <a:t>4/2/23</a:t>
             </a:fld>
             <a:endParaRPr lang="en-US"/>
           </a:p>
@@ -6364,7 +6365,7 @@
             <a:fld id="{0DAF61AA-5A98-4049-A93E-477E5505141A}" type="datetimeFigureOut">
               <a:rPr lang="en-US" smtClean="0"/>
               <a:pPr/>
-              <a:t>3/27/2023</a:t>
+              <a:t>4/2/23</a:t>
             </a:fld>
             <a:endParaRPr lang="en-US" dirty="0"/>
           </a:p>
@@ -10690,7 +10691,19 @@
             </a:pPr>
             <a:r>
               <a:rPr lang="en-CA" sz="2400" dirty="0"/>
-              <a:t>3 000 recordings from 6 users</a:t>
+              <a:t>3 000 recordings from 6 users </a:t>
+            </a:r>
+            <a:r>
+              <a:rPr lang="en-CA" sz="1200" dirty="0"/>
+              <a:t>(https://</a:t>
+            </a:r>
+            <a:r>
+              <a:rPr lang="en-CA" sz="1200" dirty="0" err="1"/>
+              <a:t>www.kaggle.com</a:t>
+            </a:r>
+            <a:r>
+              <a:rPr lang="en-CA" sz="1200" dirty="0"/>
+              <a:t>/datasets/alanchn31/free-spoken-digits)</a:t>
             </a:r>
           </a:p>
           <a:p>
@@ -10779,10 +10792,18 @@
               <a:buChar char="•"/>
             </a:pPr>
             <a:r>
-              <a:rPr lang="en-CA" sz="2400" dirty="0"/>
+              <a:rPr lang="en-CA" sz="2400" dirty="0">
+                <a:highlight>
+                  <a:srgbClr val="FFFF00"/>
+                </a:highlight>
+              </a:rPr>
               <a:t>500 Gaussian components</a:t>
             </a:r>
-            <a:endParaRPr lang="en-CA" sz="2800" dirty="0"/>
+            <a:endParaRPr lang="en-CA" sz="2800" dirty="0">
+              <a:highlight>
+                <a:srgbClr val="FFFF00"/>
+              </a:highlight>
+            </a:endParaRPr>
           </a:p>
         </p:txBody>
       </p:sp>
@@ -11345,6 +11366,175 @@
       </p:grpSpPr>
       <p:sp>
         <p:nvSpPr>
+          <p:cNvPr id="2" name="Title 1">
+            <a:extLst>
+              <a:ext uri="{FF2B5EF4-FFF2-40B4-BE49-F238E27FC236}">
+                <a16:creationId xmlns:a16="http://schemas.microsoft.com/office/drawing/2014/main" id="{03675C58-3E51-E4B5-A470-152E3B6A21EC}"/>
+              </a:ext>
+            </a:extLst>
+          </p:cNvPr>
+          <p:cNvSpPr>
+            <a:spLocks noGrp="1"/>
+          </p:cNvSpPr>
+          <p:nvPr>
+            <p:ph type="title"/>
+          </p:nvPr>
+        </p:nvSpPr>
+        <p:spPr/>
+        <p:txBody>
+          <a:bodyPr>
+            <a:normAutofit fontScale="90000"/>
+          </a:bodyPr>
+          <a:lstStyle/>
+          <a:p>
+            <a:r>
+              <a:rPr lang="en-US" dirty="0">
+                <a:highlight>
+                  <a:srgbClr val="FFFF00"/>
+                </a:highlight>
+              </a:rPr>
+              <a:t>Slide about </a:t>
+            </a:r>
+            <a:r>
+              <a:rPr lang="en-CA" sz="4400" dirty="0">
+                <a:highlight>
+                  <a:srgbClr val="FFFF00"/>
+                </a:highlight>
+              </a:rPr>
+              <a:t>Mel Frequency Cepstral Coefficients?</a:t>
+            </a:r>
+            <a:endParaRPr lang="en-US" dirty="0">
+              <a:highlight>
+                <a:srgbClr val="FFFF00"/>
+              </a:highlight>
+            </a:endParaRPr>
+          </a:p>
+        </p:txBody>
+      </p:sp>
+      <p:sp>
+        <p:nvSpPr>
+          <p:cNvPr id="6" name="TextBox 5">
+            <a:extLst>
+              <a:ext uri="{FF2B5EF4-FFF2-40B4-BE49-F238E27FC236}">
+                <a16:creationId xmlns:a16="http://schemas.microsoft.com/office/drawing/2014/main" id="{FF0DA62F-F622-BFC3-98FB-5A434F01AD63}"/>
+              </a:ext>
+            </a:extLst>
+          </p:cNvPr>
+          <p:cNvSpPr txBox="1"/>
+          <p:nvPr/>
+        </p:nvSpPr>
+        <p:spPr>
+          <a:xfrm>
+            <a:off x="838200" y="1690688"/>
+            <a:ext cx="10515600" cy="3970318"/>
+          </a:xfrm>
+          <a:prstGeom prst="rect">
+            <a:avLst/>
+          </a:prstGeom>
+          <a:noFill/>
+        </p:spPr>
+        <p:txBody>
+          <a:bodyPr wrap="square" rtlCol="0">
+            <a:spAutoFit/>
+          </a:bodyPr>
+          <a:lstStyle/>
+          <a:p>
+            <a:pPr marL="457200" indent="-457200">
+              <a:buFont typeface="Arial" panose="020B0604020202020204" pitchFamily="34" charset="0"/>
+              <a:buChar char="•"/>
+            </a:pPr>
+            <a:r>
+              <a:rPr lang="en-CA" sz="2800" dirty="0"/>
+              <a:t>Reduces the dimensions of audio to focus on important </a:t>
+            </a:r>
+            <a:r>
+              <a:rPr lang="en-CA" sz="2800" dirty="0" err="1"/>
+              <a:t>charecteristics</a:t>
+            </a:r>
+            <a:r>
+              <a:rPr lang="en-CA" sz="2800"/>
+              <a:t> </a:t>
+            </a:r>
+            <a:r>
+              <a:rPr lang="en-CA" sz="2800" dirty="0"/>
+              <a:t>and improve model performance</a:t>
+            </a:r>
+          </a:p>
+          <a:p>
+            <a:endParaRPr lang="en-CA" sz="2800" dirty="0"/>
+          </a:p>
+          <a:p>
+            <a:pPr marL="457200" indent="-457200">
+              <a:buFont typeface="Arial" panose="020B0604020202020204" pitchFamily="34" charset="0"/>
+              <a:buChar char="•"/>
+            </a:pPr>
+            <a:r>
+              <a:rPr lang="en-CA" sz="2800" dirty="0"/>
+              <a:t>Robust to external noise by applying smoothing filters</a:t>
+            </a:r>
+          </a:p>
+          <a:p>
+            <a:endParaRPr lang="en-CA" sz="2800" dirty="0"/>
+          </a:p>
+          <a:p>
+            <a:pPr marL="457200" indent="-457200">
+              <a:buFont typeface="Arial" panose="020B0604020202020204" pitchFamily="34" charset="0"/>
+              <a:buChar char="•"/>
+            </a:pPr>
+            <a:r>
+              <a:rPr lang="en-CA" sz="2800" dirty="0"/>
+              <a:t>Uses </a:t>
+            </a:r>
+            <a:r>
+              <a:rPr lang="en-CA" sz="2800" dirty="0" err="1"/>
+              <a:t>mel</a:t>
+            </a:r>
+            <a:r>
+              <a:rPr lang="en-CA" sz="2800" dirty="0"/>
+              <a:t>-scale filter bank that makes the audio more “human” like (emphasizes lower frequencies, de-emphasizes higher)</a:t>
+            </a:r>
+          </a:p>
+          <a:p>
+            <a:pPr marL="457200" indent="-457200">
+              <a:buFont typeface="Arial" panose="020B0604020202020204" pitchFamily="34" charset="0"/>
+              <a:buChar char="•"/>
+            </a:pPr>
+            <a:endParaRPr lang="en-CA" sz="2800" dirty="0"/>
+          </a:p>
+        </p:txBody>
+      </p:sp>
+    </p:spTree>
+    <p:extLst>
+      <p:ext uri="{BB962C8B-B14F-4D97-AF65-F5344CB8AC3E}">
+        <p14:creationId xmlns:p14="http://schemas.microsoft.com/office/powerpoint/2010/main" val="2378602270"/>
+      </p:ext>
+    </p:extLst>
+  </p:cSld>
+  <p:clrMapOvr>
+    <a:masterClrMapping/>
+  </p:clrMapOvr>
+</p:sld>
+</file>
+
+<file path=ppt/slides/slide7.xml><?xml version="1.0" encoding="utf-8"?>
+<p:sld xmlns:a="http://schemas.openxmlformats.org/drawingml/2006/main" xmlns:r="http://schemas.openxmlformats.org/officeDocument/2006/relationships" xmlns:p="http://schemas.openxmlformats.org/presentationml/2006/main">
+  <p:cSld>
+    <p:spTree>
+      <p:nvGrpSpPr>
+        <p:cNvPr id="1" name=""/>
+        <p:cNvGrpSpPr/>
+        <p:nvPr/>
+      </p:nvGrpSpPr>
+      <p:grpSpPr>
+        <a:xfrm>
+          <a:off x="0" y="0"/>
+          <a:ext cx="0" cy="0"/>
+          <a:chOff x="0" y="0"/>
+          <a:chExt cx="0" cy="0"/>
+        </a:xfrm>
+      </p:grpSpPr>
+      <p:sp>
+        <p:nvSpPr>
           <p:cNvPr id="4" name="TextBox 3">
             <a:extLst>
               <a:ext uri="{FF2B5EF4-FFF2-40B4-BE49-F238E27FC236}">

</xml_diff>